<commit_message>
diagram and image fixes for ch 13
</commit_message>
<xml_diff>
--- a/images/management/src/chain.pptx
+++ b/images/management/src/chain.pptx
@@ -106,6 +106,11 @@
       </a:defRPr>
     </a:lvl9pPr>
   </p:defaultTextStyle>
+  <p:extLst>
+    <p:ext uri="{EFAFB233-063F-42B5-8137-9DF3F51BA10A}">
+      <p15:sldGuideLst xmlns:p15="http://schemas.microsoft.com/office/powerpoint/2012/main"/>
+    </p:ext>
+  </p:extLst>
 </p:presentation>
 </file>
 
@@ -832,7 +837,7 @@
     <inkml:brush xml:id="br0">
       <inkml:brushProperty name="width" value="0.3" units="cm"/>
       <inkml:brushProperty name="height" value="0.6" units="cm"/>
-      <inkml:brushProperty name="color" value="#00B44B"/>
+      <inkml:brushProperty name="color" value="#7D943C"/>
       <inkml:brushProperty name="tip" value="rectangle"/>
       <inkml:brushProperty name="rasterOp" value="maskPen"/>
     </inkml:brush>
@@ -862,7 +867,7 @@
     <inkml:brush xml:id="br0">
       <inkml:brushProperty name="width" value="0.3" units="cm"/>
       <inkml:brushProperty name="height" value="0.6" units="cm"/>
-      <inkml:brushProperty name="color" value="#00B44B"/>
+      <inkml:brushProperty name="color" value="#7D943C"/>
       <inkml:brushProperty name="tip" value="rectangle"/>
       <inkml:brushProperty name="rasterOp" value="maskPen"/>
     </inkml:brush>
@@ -892,7 +897,7 @@
     <inkml:brush xml:id="br0">
       <inkml:brushProperty name="width" value="0.3" units="cm"/>
       <inkml:brushProperty name="height" value="0.6" units="cm"/>
-      <inkml:brushProperty name="color" value="#00B44B"/>
+      <inkml:brushProperty name="color" value="#7D943C"/>
       <inkml:brushProperty name="tip" value="rectangle"/>
       <inkml:brushProperty name="rasterOp" value="maskPen"/>
     </inkml:brush>
@@ -922,7 +927,7 @@
     <inkml:brush xml:id="br0">
       <inkml:brushProperty name="width" value="0.3" units="cm"/>
       <inkml:brushProperty name="height" value="0.6" units="cm"/>
-      <inkml:brushProperty name="color" value="#00B44B"/>
+      <inkml:brushProperty name="color" value="#7D943C"/>
       <inkml:brushProperty name="tip" value="rectangle"/>
       <inkml:brushProperty name="rasterOp" value="maskPen"/>
     </inkml:brush>
@@ -952,7 +957,7 @@
     <inkml:brush xml:id="br0">
       <inkml:brushProperty name="width" value="0.3" units="cm"/>
       <inkml:brushProperty name="height" value="0.6" units="cm"/>
-      <inkml:brushProperty name="color" value="#00B44B"/>
+      <inkml:brushProperty name="color" value="#7D943C"/>
       <inkml:brushProperty name="tip" value="rectangle"/>
       <inkml:brushProperty name="rasterOp" value="maskPen"/>
     </inkml:brush>
@@ -982,7 +987,7 @@
     <inkml:brush xml:id="br0">
       <inkml:brushProperty name="width" value="0.3" units="cm"/>
       <inkml:brushProperty name="height" value="0.6" units="cm"/>
-      <inkml:brushProperty name="color" value="#FF2500"/>
+      <inkml:brushProperty name="color" value="#C93431"/>
       <inkml:brushProperty name="tip" value="rectangle"/>
       <inkml:brushProperty name="rasterOp" value="maskPen"/>
     </inkml:brush>
@@ -1012,7 +1017,7 @@
     <inkml:brush xml:id="br0">
       <inkml:brushProperty name="width" value="0.3" units="cm"/>
       <inkml:brushProperty name="height" value="0.6" units="cm"/>
-      <inkml:brushProperty name="color" value="#0069AF"/>
+      <inkml:brushProperty name="color" value="#347FB5"/>
       <inkml:brushProperty name="tip" value="rectangle"/>
       <inkml:brushProperty name="rasterOp" value="maskPen"/>
     </inkml:brush>
@@ -1069,7 +1074,7 @@
     <inkml:brush xml:id="br0">
       <inkml:brushProperty name="width" value="0.3" units="cm"/>
       <inkml:brushProperty name="height" value="0.6" units="cm"/>
-      <inkml:brushProperty name="color" value="#0069AF"/>
+      <inkml:brushProperty name="color" value="#347FB5"/>
       <inkml:brushProperty name="tip" value="rectangle"/>
       <inkml:brushProperty name="rasterOp" value="maskPen"/>
     </inkml:brush>
@@ -1099,7 +1104,7 @@
     <inkml:brush xml:id="br0">
       <inkml:brushProperty name="width" value="0.3" units="cm"/>
       <inkml:brushProperty name="height" value="0.6" units="cm"/>
-      <inkml:brushProperty name="color" value="#0069AF"/>
+      <inkml:brushProperty name="color" value="#347FB5"/>
       <inkml:brushProperty name="tip" value="rectangle"/>
       <inkml:brushProperty name="rasterOp" value="maskPen"/>
     </inkml:brush>
@@ -1773,7 +1778,7 @@
           <a:p>
             <a:fld id="{8DD078A9-BFCE-3B45-9BDF-A18D8E9B425D}" type="datetimeFigureOut">
               <a:rPr lang="en-US" smtClean="0"/>
-              <a:t>9/23/22</a:t>
+              <a:t>12/19/23</a:t>
             </a:fld>
             <a:endParaRPr lang="en-US"/>
           </a:p>
@@ -1971,7 +1976,7 @@
           <a:p>
             <a:fld id="{8DD078A9-BFCE-3B45-9BDF-A18D8E9B425D}" type="datetimeFigureOut">
               <a:rPr lang="en-US" smtClean="0"/>
-              <a:t>9/23/22</a:t>
+              <a:t>12/19/23</a:t>
             </a:fld>
             <a:endParaRPr lang="en-US"/>
           </a:p>
@@ -2179,7 +2184,7 @@
           <a:p>
             <a:fld id="{8DD078A9-BFCE-3B45-9BDF-A18D8E9B425D}" type="datetimeFigureOut">
               <a:rPr lang="en-US" smtClean="0"/>
-              <a:t>9/23/22</a:t>
+              <a:t>12/19/23</a:t>
             </a:fld>
             <a:endParaRPr lang="en-US"/>
           </a:p>
@@ -2377,7 +2382,7 @@
           <a:p>
             <a:fld id="{8DD078A9-BFCE-3B45-9BDF-A18D8E9B425D}" type="datetimeFigureOut">
               <a:rPr lang="en-US" smtClean="0"/>
-              <a:t>9/23/22</a:t>
+              <a:t>12/19/23</a:t>
             </a:fld>
             <a:endParaRPr lang="en-US"/>
           </a:p>
@@ -2652,7 +2657,7 @@
           <a:p>
             <a:fld id="{8DD078A9-BFCE-3B45-9BDF-A18D8E9B425D}" type="datetimeFigureOut">
               <a:rPr lang="en-US" smtClean="0"/>
-              <a:t>9/23/22</a:t>
+              <a:t>12/19/23</a:t>
             </a:fld>
             <a:endParaRPr lang="en-US"/>
           </a:p>
@@ -2917,7 +2922,7 @@
           <a:p>
             <a:fld id="{8DD078A9-BFCE-3B45-9BDF-A18D8E9B425D}" type="datetimeFigureOut">
               <a:rPr lang="en-US" smtClean="0"/>
-              <a:t>9/23/22</a:t>
+              <a:t>12/19/23</a:t>
             </a:fld>
             <a:endParaRPr lang="en-US"/>
           </a:p>
@@ -3329,7 +3334,7 @@
           <a:p>
             <a:fld id="{8DD078A9-BFCE-3B45-9BDF-A18D8E9B425D}" type="datetimeFigureOut">
               <a:rPr lang="en-US" smtClean="0"/>
-              <a:t>9/23/22</a:t>
+              <a:t>12/19/23</a:t>
             </a:fld>
             <a:endParaRPr lang="en-US"/>
           </a:p>
@@ -3470,7 +3475,7 @@
           <a:p>
             <a:fld id="{8DD078A9-BFCE-3B45-9BDF-A18D8E9B425D}" type="datetimeFigureOut">
               <a:rPr lang="en-US" smtClean="0"/>
-              <a:t>9/23/22</a:t>
+              <a:t>12/19/23</a:t>
             </a:fld>
             <a:endParaRPr lang="en-US"/>
           </a:p>
@@ -3583,7 +3588,7 @@
           <a:p>
             <a:fld id="{8DD078A9-BFCE-3B45-9BDF-A18D8E9B425D}" type="datetimeFigureOut">
               <a:rPr lang="en-US" smtClean="0"/>
-              <a:t>9/23/22</a:t>
+              <a:t>12/19/23</a:t>
             </a:fld>
             <a:endParaRPr lang="en-US"/>
           </a:p>
@@ -3894,7 +3899,7 @@
           <a:p>
             <a:fld id="{8DD078A9-BFCE-3B45-9BDF-A18D8E9B425D}" type="datetimeFigureOut">
               <a:rPr lang="en-US" smtClean="0"/>
-              <a:t>9/23/22</a:t>
+              <a:t>12/19/23</a:t>
             </a:fld>
             <a:endParaRPr lang="en-US"/>
           </a:p>
@@ -4182,7 +4187,7 @@
           <a:p>
             <a:fld id="{8DD078A9-BFCE-3B45-9BDF-A18D8E9B425D}" type="datetimeFigureOut">
               <a:rPr lang="en-US" smtClean="0"/>
-              <a:t>9/23/22</a:t>
+              <a:t>12/19/23</a:t>
             </a:fld>
             <a:endParaRPr lang="en-US"/>
           </a:p>
@@ -4423,7 +4428,7 @@
           <a:p>
             <a:fld id="{8DD078A9-BFCE-3B45-9BDF-A18D8E9B425D}" type="datetimeFigureOut">
               <a:rPr lang="en-US" smtClean="0"/>
-              <a:t>9/23/22</a:t>
+              <a:t>12/19/23</a:t>
             </a:fld>
             <a:endParaRPr lang="en-US"/>
           </a:p>
@@ -4860,8 +4865,8 @@
             <a:chExt cx="129600" cy="775080"/>
           </a:xfrm>
         </p:grpSpPr>
-        <mc:AlternateContent xmlns:mc="http://schemas.openxmlformats.org/markup-compatibility/2006">
-          <mc:Choice xmlns:p14="http://schemas.microsoft.com/office/powerpoint/2010/main" Requires="p14">
+        <mc:AlternateContent xmlns:mc="http://schemas.openxmlformats.org/markup-compatibility/2006" xmlns:p14="http://schemas.microsoft.com/office/powerpoint/2010/main">
+          <mc:Choice Requires="p14">
             <p:contentPart p14:bwMode="auto" r:id="rId2">
               <p14:nvContentPartPr>
                 <p14:cNvPr id="54" name="Ink 53">
@@ -4880,7 +4885,7 @@
               </p14:xfrm>
             </p:contentPart>
           </mc:Choice>
-          <mc:Fallback>
+          <mc:Fallback xmlns="">
             <p:pic>
               <p:nvPicPr>
                 <p:cNvPr id="54" name="Ink 53">
@@ -4911,8 +4916,8 @@
             </p:pic>
           </mc:Fallback>
         </mc:AlternateContent>
-        <mc:AlternateContent xmlns:mc="http://schemas.openxmlformats.org/markup-compatibility/2006">
-          <mc:Choice xmlns:p14="http://schemas.microsoft.com/office/powerpoint/2010/main" Requires="p14">
+        <mc:AlternateContent xmlns:mc="http://schemas.openxmlformats.org/markup-compatibility/2006" xmlns:p14="http://schemas.microsoft.com/office/powerpoint/2010/main">
+          <mc:Choice Requires="p14">
             <p:contentPart p14:bwMode="auto" r:id="rId4">
               <p14:nvContentPartPr>
                 <p14:cNvPr id="55" name="Ink 54">
@@ -4931,7 +4936,7 @@
               </p14:xfrm>
             </p:contentPart>
           </mc:Choice>
-          <mc:Fallback>
+          <mc:Fallback xmlns="">
             <p:pic>
               <p:nvPicPr>
                 <p:cNvPr id="55" name="Ink 54">
@@ -4983,8 +4988,8 @@
             <a:chExt cx="129600" cy="775080"/>
           </a:xfrm>
         </p:grpSpPr>
-        <mc:AlternateContent xmlns:mc="http://schemas.openxmlformats.org/markup-compatibility/2006">
-          <mc:Choice xmlns:p14="http://schemas.microsoft.com/office/powerpoint/2010/main" Requires="p14">
+        <mc:AlternateContent xmlns:mc="http://schemas.openxmlformats.org/markup-compatibility/2006" xmlns:p14="http://schemas.microsoft.com/office/powerpoint/2010/main">
+          <mc:Choice Requires="p14">
             <p:contentPart p14:bwMode="auto" r:id="rId6">
               <p14:nvContentPartPr>
                 <p14:cNvPr id="51" name="Ink 50">
@@ -5003,7 +5008,7 @@
               </p14:xfrm>
             </p:contentPart>
           </mc:Choice>
-          <mc:Fallback>
+          <mc:Fallback xmlns="">
             <p:pic>
               <p:nvPicPr>
                 <p:cNvPr id="51" name="Ink 50">
@@ -5034,8 +5039,8 @@
             </p:pic>
           </mc:Fallback>
         </mc:AlternateContent>
-        <mc:AlternateContent xmlns:mc="http://schemas.openxmlformats.org/markup-compatibility/2006">
-          <mc:Choice xmlns:p14="http://schemas.microsoft.com/office/powerpoint/2010/main" Requires="p14">
+        <mc:AlternateContent xmlns:mc="http://schemas.openxmlformats.org/markup-compatibility/2006" xmlns:p14="http://schemas.microsoft.com/office/powerpoint/2010/main">
+          <mc:Choice Requires="p14">
             <p:contentPart p14:bwMode="auto" r:id="rId7">
               <p14:nvContentPartPr>
                 <p14:cNvPr id="52" name="Ink 51">
@@ -5054,7 +5059,7 @@
               </p14:xfrm>
             </p:contentPart>
           </mc:Choice>
-          <mc:Fallback>
+          <mc:Fallback xmlns="">
             <p:pic>
               <p:nvPicPr>
                 <p:cNvPr id="52" name="Ink 51">
@@ -5130,8 +5135,8 @@
         </p:nvSpPr>
         <p:spPr>
           <a:xfrm>
-            <a:off x="8437495" y="890755"/>
-            <a:ext cx="1077796" cy="369332"/>
+            <a:off x="8376838" y="890755"/>
+            <a:ext cx="1138453" cy="369332"/>
           </a:xfrm>
           <a:prstGeom prst="rect">
             <a:avLst/>
@@ -5146,7 +5151,10 @@
           <a:p>
             <a:pPr algn="r"/>
             <a:r>
-              <a:rPr lang="en-US" b="1" dirty="0"/>
+              <a:rPr lang="en-US" b="1" dirty="0">
+                <a:latin typeface="Source Sans Pro" panose="020B0503030403020204" pitchFamily="34" charset="0"/>
+                <a:ea typeface="Source Sans Pro" panose="020B0503030403020204" pitchFamily="34" charset="0"/>
+              </a:rPr>
               <a:t>Raw data</a:t>
             </a:r>
           </a:p>
@@ -5166,8 +5174,8 @@
         </p:nvSpPr>
         <p:spPr>
           <a:xfrm>
-            <a:off x="7792127" y="2024337"/>
-            <a:ext cx="1723164" cy="369332"/>
+            <a:off x="7669914" y="2024337"/>
+            <a:ext cx="1845377" cy="369332"/>
           </a:xfrm>
           <a:prstGeom prst="rect">
             <a:avLst/>
@@ -5182,7 +5190,10 @@
           <a:p>
             <a:pPr algn="r"/>
             <a:r>
-              <a:rPr lang="en-US" b="1" dirty="0"/>
+              <a:rPr lang="en-US" b="1" dirty="0">
+                <a:latin typeface="Source Sans Pro" panose="020B0503030403020204" pitchFamily="34" charset="0"/>
+                <a:ea typeface="Source Sans Pro" panose="020B0503030403020204" pitchFamily="34" charset="0"/>
+              </a:rPr>
               <a:t>Raw digital data</a:t>
             </a:r>
           </a:p>
@@ -5202,8 +5213,8 @@
         </p:nvSpPr>
         <p:spPr>
           <a:xfrm>
-            <a:off x="7891898" y="3157919"/>
-            <a:ext cx="1623393" cy="369332"/>
+            <a:off x="7775711" y="3157919"/>
+            <a:ext cx="1739580" cy="369332"/>
           </a:xfrm>
           <a:prstGeom prst="rect">
             <a:avLst/>
@@ -5218,7 +5229,10 @@
           <a:p>
             <a:pPr algn="r"/>
             <a:r>
-              <a:rPr lang="en-US" b="1" dirty="0"/>
+              <a:rPr lang="en-US" b="1" dirty="0">
+                <a:latin typeface="Source Sans Pro" panose="020B0503030403020204" pitchFamily="34" charset="0"/>
+                <a:ea typeface="Source Sans Pro" panose="020B0503030403020204" pitchFamily="34" charset="0"/>
+              </a:rPr>
               <a:t>Processed data</a:t>
             </a:r>
           </a:p>
@@ -5238,8 +5252,8 @@
         </p:nvSpPr>
         <p:spPr>
           <a:xfrm>
-            <a:off x="7439017" y="4291501"/>
-            <a:ext cx="2076274" cy="369332"/>
+            <a:off x="7285193" y="4291501"/>
+            <a:ext cx="2230098" cy="369332"/>
           </a:xfrm>
           <a:prstGeom prst="rect">
             <a:avLst/>
@@ -5254,7 +5268,10 @@
           <a:p>
             <a:pPr algn="r"/>
             <a:r>
-              <a:rPr lang="en-US" b="1" dirty="0"/>
+              <a:rPr lang="en-US" b="1" dirty="0">
+                <a:latin typeface="Source Sans Pro" panose="020B0503030403020204" pitchFamily="34" charset="0"/>
+                <a:ea typeface="Source Sans Pro" panose="020B0503030403020204" pitchFamily="34" charset="0"/>
+              </a:rPr>
               <a:t>Quantitative results</a:t>
             </a:r>
           </a:p>
@@ -5274,8 +5291,8 @@
         </p:nvSpPr>
         <p:spPr>
           <a:xfrm>
-            <a:off x="7722428" y="5425083"/>
-            <a:ext cx="1792863" cy="369332"/>
+            <a:off x="7592970" y="5425083"/>
+            <a:ext cx="1922321" cy="369332"/>
           </a:xfrm>
           <a:prstGeom prst="rect">
             <a:avLst/>
@@ -5290,7 +5307,10 @@
           <a:p>
             <a:pPr algn="r"/>
             <a:r>
-              <a:rPr lang="en-US" b="1" dirty="0"/>
+              <a:rPr lang="en-US" b="1" dirty="0">
+                <a:latin typeface="Source Sans Pro" panose="020B0503030403020204" pitchFamily="34" charset="0"/>
+                <a:ea typeface="Source Sans Pro" panose="020B0503030403020204" pitchFamily="34" charset="0"/>
+              </a:rPr>
               <a:t>Research reports</a:t>
             </a:r>
           </a:p>
@@ -5316,8 +5336,8 @@
             <a:chExt cx="129600" cy="775080"/>
           </a:xfrm>
         </p:grpSpPr>
-        <mc:AlternateContent xmlns:mc="http://schemas.openxmlformats.org/markup-compatibility/2006">
-          <mc:Choice xmlns:p14="http://schemas.microsoft.com/office/powerpoint/2010/main" Requires="p14">
+        <mc:AlternateContent xmlns:mc="http://schemas.openxmlformats.org/markup-compatibility/2006" xmlns:p14="http://schemas.microsoft.com/office/powerpoint/2010/main">
+          <mc:Choice Requires="p14">
             <p:contentPart p14:bwMode="auto" r:id="rId9">
               <p14:nvContentPartPr>
                 <p14:cNvPr id="17" name="Ink 16">
@@ -5336,7 +5356,7 @@
               </p14:xfrm>
             </p:contentPart>
           </mc:Choice>
-          <mc:Fallback>
+          <mc:Fallback xmlns="">
             <p:pic>
               <p:nvPicPr>
                 <p:cNvPr id="17" name="Ink 16">
@@ -5367,8 +5387,8 @@
             </p:pic>
           </mc:Fallback>
         </mc:AlternateContent>
-        <mc:AlternateContent xmlns:mc="http://schemas.openxmlformats.org/markup-compatibility/2006">
-          <mc:Choice xmlns:p14="http://schemas.microsoft.com/office/powerpoint/2010/main" Requires="p14">
+        <mc:AlternateContent xmlns:mc="http://schemas.openxmlformats.org/markup-compatibility/2006" xmlns:p14="http://schemas.microsoft.com/office/powerpoint/2010/main">
+          <mc:Choice Requires="p14">
             <p:contentPart p14:bwMode="auto" r:id="rId10">
               <p14:nvContentPartPr>
                 <p14:cNvPr id="18" name="Ink 17">
@@ -5387,7 +5407,7 @@
               </p14:xfrm>
             </p:contentPart>
           </mc:Choice>
-          <mc:Fallback>
+          <mc:Fallback xmlns="">
             <p:pic>
               <p:nvPicPr>
                 <p:cNvPr id="18" name="Ink 17">
@@ -5449,7 +5469,7 @@
           <a:p>
             <a:r>
               <a:rPr lang="en-US" sz="1200" dirty="0">
-                <a:latin typeface="Times" pitchFamily="2" charset="0"/>
+                <a:latin typeface="ETbb" panose="02000503000000000000" pitchFamily="2" charset="0"/>
               </a:rPr>
               <a:t>Unaltered analog data</a:t>
             </a:r>
@@ -5457,7 +5477,7 @@
           <a:p>
             <a:r>
               <a:rPr lang="en-US" sz="1200" dirty="0">
-                <a:latin typeface="Times" pitchFamily="2" charset="0"/>
+                <a:latin typeface="ETbb" panose="02000503000000000000" pitchFamily="2" charset="0"/>
               </a:rPr>
               <a:t>(e.g., paper surveys)</a:t>
             </a:r>
@@ -5479,7 +5499,7 @@
         <p:spPr>
           <a:xfrm>
             <a:off x="9634424" y="1917559"/>
-            <a:ext cx="1951848" cy="646331"/>
+            <a:ext cx="2074100" cy="646331"/>
           </a:xfrm>
           <a:prstGeom prst="rect">
             <a:avLst/>
@@ -5494,7 +5514,7 @@
           <a:p>
             <a:r>
               <a:rPr lang="en-US" sz="1200" dirty="0">
-                <a:latin typeface="Times" pitchFamily="2" charset="0"/>
+                <a:latin typeface="ETbb" panose="02000503000000000000" pitchFamily="2" charset="0"/>
               </a:rPr>
               <a:t>Data in their most basic digital form (e.g., videos or experiment software output)</a:t>
             </a:r>
@@ -5531,7 +5551,7 @@
           <a:p>
             <a:r>
               <a:rPr lang="en-US" sz="1200" dirty="0">
-                <a:latin typeface="Times" pitchFamily="2" charset="0"/>
+                <a:latin typeface="ETbb" panose="02000503000000000000" pitchFamily="2" charset="0"/>
               </a:rPr>
               <a:t>Data after initial cleaning and preprocessing (e.g., spreadsheets)</a:t>
             </a:r>
@@ -5568,7 +5588,7 @@
           <a:p>
             <a:r>
               <a:rPr lang="en-US" sz="1200" dirty="0">
-                <a:latin typeface="Times" pitchFamily="2" charset="0"/>
+                <a:latin typeface="ETbb" panose="02000503000000000000" pitchFamily="2" charset="0"/>
               </a:rPr>
               <a:t>Figures, tables, and numeric values</a:t>
             </a:r>
@@ -5605,7 +5625,7 @@
           <a:p>
             <a:r>
               <a:rPr lang="en-US" sz="1200" dirty="0">
-                <a:latin typeface="Times" pitchFamily="2" charset="0"/>
+                <a:latin typeface="ETbb" panose="02000503000000000000" pitchFamily="2" charset="0"/>
               </a:rPr>
               <a:t>Papers, posters, slides</a:t>
             </a:r>
@@ -5664,7 +5684,7 @@
         <p:spPr>
           <a:xfrm>
             <a:off x="8813679" y="3758683"/>
-            <a:ext cx="774507" cy="307777"/>
+            <a:ext cx="795411" cy="307777"/>
           </a:xfrm>
           <a:prstGeom prst="rect">
             <a:avLst/>
@@ -5680,7 +5700,10 @@
           <a:lstStyle/>
           <a:p>
             <a:r>
-              <a:rPr lang="en-US" sz="1400" dirty="0"/>
+              <a:rPr lang="en-US" sz="1400" dirty="0">
+                <a:latin typeface="Source Sans Pro" panose="020B0503030403020204" pitchFamily="34" charset="0"/>
+                <a:ea typeface="Source Sans Pro" panose="020B0503030403020204" pitchFamily="34" charset="0"/>
+              </a:rPr>
               <a:t>Analysis</a:t>
             </a:r>
           </a:p>
@@ -5701,7 +5724,7 @@
         <p:spPr>
           <a:xfrm>
             <a:off x="8721314" y="2591081"/>
-            <a:ext cx="959237" cy="307777"/>
+            <a:ext cx="1000595" cy="307777"/>
           </a:xfrm>
           <a:prstGeom prst="rect">
             <a:avLst/>
@@ -5717,7 +5740,10 @@
           <a:lstStyle/>
           <a:p>
             <a:r>
-              <a:rPr lang="en-US" sz="1400" dirty="0"/>
+              <a:rPr lang="en-US" sz="1400" dirty="0">
+                <a:latin typeface="Source Sans Pro" panose="020B0503030403020204" pitchFamily="34" charset="0"/>
+                <a:ea typeface="Source Sans Pro" panose="020B0503030403020204" pitchFamily="34" charset="0"/>
+              </a:rPr>
               <a:t>Processing</a:t>
             </a:r>
           </a:p>
@@ -5738,7 +5764,7 @@
         <p:spPr>
           <a:xfrm>
             <a:off x="8695730" y="1464575"/>
-            <a:ext cx="1010405" cy="307777"/>
+            <a:ext cx="1048685" cy="307777"/>
           </a:xfrm>
           <a:prstGeom prst="rect">
             <a:avLst/>
@@ -5754,14 +5780,17 @@
           <a:lstStyle/>
           <a:p>
             <a:r>
-              <a:rPr lang="en-US" sz="1400" dirty="0"/>
+              <a:rPr lang="en-US" sz="1400" dirty="0">
+                <a:latin typeface="Source Sans Pro" panose="020B0503030403020204" pitchFamily="34" charset="0"/>
+                <a:ea typeface="Source Sans Pro" panose="020B0503030403020204" pitchFamily="34" charset="0"/>
+              </a:rPr>
               <a:t>Digitization</a:t>
             </a:r>
           </a:p>
         </p:txBody>
       </p:sp>
-      <mc:AlternateContent xmlns:mc="http://schemas.openxmlformats.org/markup-compatibility/2006">
-        <mc:Choice xmlns:p14="http://schemas.microsoft.com/office/powerpoint/2010/main" Requires="p14">
+      <mc:AlternateContent xmlns:mc="http://schemas.openxmlformats.org/markup-compatibility/2006" xmlns:p14="http://schemas.microsoft.com/office/powerpoint/2010/main">
+        <mc:Choice Requires="p14">
           <p:contentPart p14:bwMode="auto" r:id="rId11">
             <p14:nvContentPartPr>
               <p14:cNvPr id="71" name="Ink 70">
@@ -5780,7 +5809,7 @@
             </p14:xfrm>
           </p:contentPart>
         </mc:Choice>
-        <mc:Fallback>
+        <mc:Fallback xmlns="">
           <p:pic>
             <p:nvPicPr>
               <p:cNvPr id="71" name="Ink 70">
@@ -5851,8 +5880,8 @@
               <a:chExt cx="9720" cy="178920"/>
             </a:xfrm>
           </p:grpSpPr>
-          <mc:AlternateContent xmlns:mc="http://schemas.openxmlformats.org/markup-compatibility/2006">
-            <mc:Choice xmlns:p14="http://schemas.microsoft.com/office/powerpoint/2010/main" Requires="p14">
+          <mc:AlternateContent xmlns:mc="http://schemas.openxmlformats.org/markup-compatibility/2006" xmlns:p14="http://schemas.microsoft.com/office/powerpoint/2010/main">
+            <mc:Choice Requires="p14">
               <p:contentPart p14:bwMode="auto" r:id="rId13">
                 <p14:nvContentPartPr>
                   <p14:cNvPr id="66" name="Ink 65">
@@ -5871,7 +5900,7 @@
                 </p14:xfrm>
               </p:contentPart>
             </mc:Choice>
-            <mc:Fallback>
+            <mc:Fallback xmlns="">
               <p:pic>
                 <p:nvPicPr>
                   <p:cNvPr id="66" name="Ink 65">
@@ -5902,8 +5931,8 @@
               </p:pic>
             </mc:Fallback>
           </mc:AlternateContent>
-          <mc:AlternateContent xmlns:mc="http://schemas.openxmlformats.org/markup-compatibility/2006">
-            <mc:Choice xmlns:p14="http://schemas.microsoft.com/office/powerpoint/2010/main" Requires="p14">
+          <mc:AlternateContent xmlns:mc="http://schemas.openxmlformats.org/markup-compatibility/2006" xmlns:p14="http://schemas.microsoft.com/office/powerpoint/2010/main">
+            <mc:Choice Requires="p14">
               <p:contentPart p14:bwMode="auto" r:id="rId14">
                 <p14:nvContentPartPr>
                   <p14:cNvPr id="67" name="Ink 66">
@@ -5922,7 +5951,7 @@
                 </p14:xfrm>
               </p:contentPart>
             </mc:Choice>
-            <mc:Fallback>
+            <mc:Fallback xmlns="">
               <p:pic>
                 <p:nvPicPr>
                   <p:cNvPr id="67" name="Ink 66">
@@ -5953,8 +5982,8 @@
               </p:pic>
             </mc:Fallback>
           </mc:AlternateContent>
-          <mc:AlternateContent xmlns:mc="http://schemas.openxmlformats.org/markup-compatibility/2006">
-            <mc:Choice xmlns:p14="http://schemas.microsoft.com/office/powerpoint/2010/main" Requires="p14">
+          <mc:AlternateContent xmlns:mc="http://schemas.openxmlformats.org/markup-compatibility/2006" xmlns:p14="http://schemas.microsoft.com/office/powerpoint/2010/main">
+            <mc:Choice Requires="p14">
               <p:contentPart p14:bwMode="auto" r:id="rId15">
                 <p14:nvContentPartPr>
                   <p14:cNvPr id="69" name="Ink 68">
@@ -5973,7 +6002,7 @@
                 </p14:xfrm>
               </p:contentPart>
             </mc:Choice>
-            <mc:Fallback>
+            <mc:Fallback xmlns="">
               <p:pic>
                 <p:nvPicPr>
                   <p:cNvPr id="69" name="Ink 68">
@@ -6025,8 +6054,8 @@
               <a:chExt cx="116640" cy="122400"/>
             </a:xfrm>
           </p:grpSpPr>
-          <mc:AlternateContent xmlns:mc="http://schemas.openxmlformats.org/markup-compatibility/2006">
-            <mc:Choice xmlns:p14="http://schemas.microsoft.com/office/powerpoint/2010/main" Requires="p14">
+          <mc:AlternateContent xmlns:mc="http://schemas.openxmlformats.org/markup-compatibility/2006" xmlns:p14="http://schemas.microsoft.com/office/powerpoint/2010/main">
+            <mc:Choice Requires="p14">
               <p:contentPart p14:bwMode="auto" r:id="rId16">
                 <p14:nvContentPartPr>
                   <p14:cNvPr id="72" name="Ink 71">
@@ -6045,7 +6074,7 @@
                 </p14:xfrm>
               </p:contentPart>
             </mc:Choice>
-            <mc:Fallback>
+            <mc:Fallback xmlns="">
               <p:pic>
                 <p:nvPicPr>
                   <p:cNvPr id="72" name="Ink 71">
@@ -6076,8 +6105,8 @@
               </p:pic>
             </mc:Fallback>
           </mc:AlternateContent>
-          <mc:AlternateContent xmlns:mc="http://schemas.openxmlformats.org/markup-compatibility/2006">
-            <mc:Choice xmlns:p14="http://schemas.microsoft.com/office/powerpoint/2010/main" Requires="p14">
+          <mc:AlternateContent xmlns:mc="http://schemas.openxmlformats.org/markup-compatibility/2006" xmlns:p14="http://schemas.microsoft.com/office/powerpoint/2010/main">
+            <mc:Choice Requires="p14">
               <p:contentPart p14:bwMode="auto" r:id="rId17">
                 <p14:nvContentPartPr>
                   <p14:cNvPr id="73" name="Ink 72">
@@ -6096,7 +6125,7 @@
                 </p14:xfrm>
               </p:contentPart>
             </mc:Choice>
-            <mc:Fallback>
+            <mc:Fallback xmlns="">
               <p:pic>
                 <p:nvPicPr>
                   <p:cNvPr id="73" name="Ink 72">
@@ -6127,8 +6156,8 @@
               </p:pic>
             </mc:Fallback>
           </mc:AlternateContent>
-          <mc:AlternateContent xmlns:mc="http://schemas.openxmlformats.org/markup-compatibility/2006">
-            <mc:Choice xmlns:p14="http://schemas.microsoft.com/office/powerpoint/2010/main" Requires="p14">
+          <mc:AlternateContent xmlns:mc="http://schemas.openxmlformats.org/markup-compatibility/2006" xmlns:p14="http://schemas.microsoft.com/office/powerpoint/2010/main">
+            <mc:Choice Requires="p14">
               <p:contentPart p14:bwMode="auto" r:id="rId18">
                 <p14:nvContentPartPr>
                   <p14:cNvPr id="74" name="Ink 73">
@@ -6147,7 +6176,7 @@
                 </p14:xfrm>
               </p:contentPart>
             </mc:Choice>
-            <mc:Fallback>
+            <mc:Fallback xmlns="">
               <p:pic>
                 <p:nvPicPr>
                   <p:cNvPr id="74" name="Ink 73">
@@ -6240,8 +6269,8 @@
           </a:prstGeom>
         </p:spPr>
       </p:pic>
-      <mc:AlternateContent xmlns:mc="http://schemas.openxmlformats.org/markup-compatibility/2006">
-        <mc:Choice xmlns:p14="http://schemas.microsoft.com/office/powerpoint/2010/main" Requires="p14">
+      <mc:AlternateContent xmlns:mc="http://schemas.openxmlformats.org/markup-compatibility/2006" xmlns:p14="http://schemas.microsoft.com/office/powerpoint/2010/main">
+        <mc:Choice Requires="p14">
           <p:contentPart p14:bwMode="auto" r:id="rId3">
             <p14:nvContentPartPr>
               <p14:cNvPr id="9" name="Ink 8">
@@ -6260,7 +6289,7 @@
             </p14:xfrm>
           </p:contentPart>
         </mc:Choice>
-        <mc:Fallback>
+        <mc:Fallback xmlns="">
           <p:pic>
             <p:nvPicPr>
               <p:cNvPr id="9" name="Ink 8">
@@ -6291,8 +6320,8 @@
           </p:pic>
         </mc:Fallback>
       </mc:AlternateContent>
-      <mc:AlternateContent xmlns:mc="http://schemas.openxmlformats.org/markup-compatibility/2006">
-        <mc:Choice xmlns:p14="http://schemas.microsoft.com/office/powerpoint/2010/main" Requires="p14">
+      <mc:AlternateContent xmlns:mc="http://schemas.openxmlformats.org/markup-compatibility/2006" xmlns:p14="http://schemas.microsoft.com/office/powerpoint/2010/main">
+        <mc:Choice Requires="p14">
           <p:contentPart p14:bwMode="auto" r:id="rId5">
             <p14:nvContentPartPr>
               <p14:cNvPr id="11" name="Ink 10">
@@ -6311,7 +6340,7 @@
             </p14:xfrm>
           </p:contentPart>
         </mc:Choice>
-        <mc:Fallback>
+        <mc:Fallback xmlns="">
           <p:pic>
             <p:nvPicPr>
               <p:cNvPr id="11" name="Ink 10">
@@ -6342,8 +6371,8 @@
           </p:pic>
         </mc:Fallback>
       </mc:AlternateContent>
-      <mc:AlternateContent xmlns:mc="http://schemas.openxmlformats.org/markup-compatibility/2006">
-        <mc:Choice xmlns:p14="http://schemas.microsoft.com/office/powerpoint/2010/main" Requires="p14">
+      <mc:AlternateContent xmlns:mc="http://schemas.openxmlformats.org/markup-compatibility/2006" xmlns:p14="http://schemas.microsoft.com/office/powerpoint/2010/main">
+        <mc:Choice Requires="p14">
           <p:contentPart p14:bwMode="auto" r:id="rId6">
             <p14:nvContentPartPr>
               <p14:cNvPr id="12" name="Ink 11">
@@ -6362,7 +6391,7 @@
             </p14:xfrm>
           </p:contentPart>
         </mc:Choice>
-        <mc:Fallback>
+        <mc:Fallback xmlns="">
           <p:pic>
             <p:nvPicPr>
               <p:cNvPr id="12" name="Ink 11">
@@ -6393,8 +6422,8 @@
           </p:pic>
         </mc:Fallback>
       </mc:AlternateContent>
-      <mc:AlternateContent xmlns:mc="http://schemas.openxmlformats.org/markup-compatibility/2006">
-        <mc:Choice xmlns:p14="http://schemas.microsoft.com/office/powerpoint/2010/main" Requires="p14">
+      <mc:AlternateContent xmlns:mc="http://schemas.openxmlformats.org/markup-compatibility/2006" xmlns:p14="http://schemas.microsoft.com/office/powerpoint/2010/main">
+        <mc:Choice Requires="p14">
           <p:contentPart p14:bwMode="auto" r:id="rId7">
             <p14:nvContentPartPr>
               <p14:cNvPr id="13" name="Ink 12">
@@ -6413,7 +6442,7 @@
             </p14:xfrm>
           </p:contentPart>
         </mc:Choice>
-        <mc:Fallback>
+        <mc:Fallback xmlns="">
           <p:pic>
             <p:nvPicPr>
               <p:cNvPr id="13" name="Ink 12">
@@ -6444,8 +6473,8 @@
           </p:pic>
         </mc:Fallback>
       </mc:AlternateContent>
-      <mc:AlternateContent xmlns:mc="http://schemas.openxmlformats.org/markup-compatibility/2006">
-        <mc:Choice xmlns:p14="http://schemas.microsoft.com/office/powerpoint/2010/main" Requires="p14">
+      <mc:AlternateContent xmlns:mc="http://schemas.openxmlformats.org/markup-compatibility/2006" xmlns:p14="http://schemas.microsoft.com/office/powerpoint/2010/main">
+        <mc:Choice Requires="p14">
           <p:contentPart p14:bwMode="auto" r:id="rId8">
             <p14:nvContentPartPr>
               <p14:cNvPr id="14" name="Ink 13">
@@ -6464,7 +6493,7 @@
             </p14:xfrm>
           </p:contentPart>
         </mc:Choice>
-        <mc:Fallback>
+        <mc:Fallback xmlns="">
           <p:pic>
             <p:nvPicPr>
               <p:cNvPr id="14" name="Ink 13">
@@ -6495,8 +6524,8 @@
           </p:pic>
         </mc:Fallback>
       </mc:AlternateContent>
-      <mc:AlternateContent xmlns:mc="http://schemas.openxmlformats.org/markup-compatibility/2006">
-        <mc:Choice xmlns:p14="http://schemas.microsoft.com/office/powerpoint/2010/main" Requires="p14">
+      <mc:AlternateContent xmlns:mc="http://schemas.openxmlformats.org/markup-compatibility/2006" xmlns:p14="http://schemas.microsoft.com/office/powerpoint/2010/main">
+        <mc:Choice Requires="p14">
           <p:contentPart p14:bwMode="auto" r:id="rId9">
             <p14:nvContentPartPr>
               <p14:cNvPr id="15" name="Ink 14">
@@ -6515,7 +6544,7 @@
             </p14:xfrm>
           </p:contentPart>
         </mc:Choice>
-        <mc:Fallback>
+        <mc:Fallback xmlns="">
           <p:pic>
             <p:nvPicPr>
               <p:cNvPr id="15" name="Ink 14">
@@ -6546,8 +6575,8 @@
           </p:pic>
         </mc:Fallback>
       </mc:AlternateContent>
-      <mc:AlternateContent xmlns:mc="http://schemas.openxmlformats.org/markup-compatibility/2006">
-        <mc:Choice xmlns:p14="http://schemas.microsoft.com/office/powerpoint/2010/main" Requires="p14">
+      <mc:AlternateContent xmlns:mc="http://schemas.openxmlformats.org/markup-compatibility/2006" xmlns:p14="http://schemas.microsoft.com/office/powerpoint/2010/main">
+        <mc:Choice Requires="p14">
           <p:contentPart p14:bwMode="auto" r:id="rId10">
             <p14:nvContentPartPr>
               <p14:cNvPr id="16" name="Ink 15">
@@ -6566,7 +6595,7 @@
             </p14:xfrm>
           </p:contentPart>
         </mc:Choice>
-        <mc:Fallback>
+        <mc:Fallback xmlns="">
           <p:pic>
             <p:nvPicPr>
               <p:cNvPr id="16" name="Ink 15">
@@ -6597,8 +6626,8 @@
           </p:pic>
         </mc:Fallback>
       </mc:AlternateContent>
-      <mc:AlternateContent xmlns:mc="http://schemas.openxmlformats.org/markup-compatibility/2006">
-        <mc:Choice xmlns:p14="http://schemas.microsoft.com/office/powerpoint/2010/main" Requires="p14">
+      <mc:AlternateContent xmlns:mc="http://schemas.openxmlformats.org/markup-compatibility/2006" xmlns:p14="http://schemas.microsoft.com/office/powerpoint/2010/main">
+        <mc:Choice Requires="p14">
           <p:contentPart p14:bwMode="auto" r:id="rId11">
             <p14:nvContentPartPr>
               <p14:cNvPr id="17" name="Ink 16">
@@ -6617,7 +6646,7 @@
             </p14:xfrm>
           </p:contentPart>
         </mc:Choice>
-        <mc:Fallback>
+        <mc:Fallback xmlns="">
           <p:pic>
             <p:nvPicPr>
               <p:cNvPr id="17" name="Ink 16">
@@ -6648,8 +6677,8 @@
           </p:pic>
         </mc:Fallback>
       </mc:AlternateContent>
-      <mc:AlternateContent xmlns:mc="http://schemas.openxmlformats.org/markup-compatibility/2006">
-        <mc:Choice xmlns:p14="http://schemas.microsoft.com/office/powerpoint/2010/main" Requires="p14">
+      <mc:AlternateContent xmlns:mc="http://schemas.openxmlformats.org/markup-compatibility/2006" xmlns:p14="http://schemas.microsoft.com/office/powerpoint/2010/main">
+        <mc:Choice Requires="p14">
           <p:contentPart p14:bwMode="auto" r:id="rId12">
             <p14:nvContentPartPr>
               <p14:cNvPr id="18" name="Ink 17">
@@ -6668,7 +6697,7 @@
             </p14:xfrm>
           </p:contentPart>
         </mc:Choice>
-        <mc:Fallback>
+        <mc:Fallback xmlns="">
           <p:pic>
             <p:nvPicPr>
               <p:cNvPr id="18" name="Ink 17">
@@ -6699,8 +6728,8 @@
           </p:pic>
         </mc:Fallback>
       </mc:AlternateContent>
-      <mc:AlternateContent xmlns:mc="http://schemas.openxmlformats.org/markup-compatibility/2006">
-        <mc:Choice xmlns:p14="http://schemas.microsoft.com/office/powerpoint/2010/main" Requires="p14">
+      <mc:AlternateContent xmlns:mc="http://schemas.openxmlformats.org/markup-compatibility/2006" xmlns:p14="http://schemas.microsoft.com/office/powerpoint/2010/main">
+        <mc:Choice Requires="p14">
           <p:contentPart p14:bwMode="auto" r:id="rId13">
             <p14:nvContentPartPr>
               <p14:cNvPr id="22" name="Ink 21">
@@ -6719,7 +6748,7 @@
             </p14:xfrm>
           </p:contentPart>
         </mc:Choice>
-        <mc:Fallback>
+        <mc:Fallback xmlns="">
           <p:pic>
             <p:nvPicPr>
               <p:cNvPr id="22" name="Ink 21">
@@ -6750,8 +6779,8 @@
           </p:pic>
         </mc:Fallback>
       </mc:AlternateContent>
-      <mc:AlternateContent xmlns:mc="http://schemas.openxmlformats.org/markup-compatibility/2006">
-        <mc:Choice xmlns:p14="http://schemas.microsoft.com/office/powerpoint/2010/main" Requires="p14">
+      <mc:AlternateContent xmlns:mc="http://schemas.openxmlformats.org/markup-compatibility/2006" xmlns:p14="http://schemas.microsoft.com/office/powerpoint/2010/main">
+        <mc:Choice Requires="p14">
           <p:contentPart p14:bwMode="auto" r:id="rId15">
             <p14:nvContentPartPr>
               <p14:cNvPr id="24" name="Ink 23">
@@ -6770,7 +6799,7 @@
             </p14:xfrm>
           </p:contentPart>
         </mc:Choice>
-        <mc:Fallback>
+        <mc:Fallback xmlns="">
           <p:pic>
             <p:nvPicPr>
               <p:cNvPr id="24" name="Ink 23">
@@ -6821,8 +6850,8 @@
             <a:chExt cx="1286640" cy="761400"/>
           </a:xfrm>
         </p:grpSpPr>
-        <mc:AlternateContent xmlns:mc="http://schemas.openxmlformats.org/markup-compatibility/2006">
-          <mc:Choice xmlns:p14="http://schemas.microsoft.com/office/powerpoint/2010/main" Requires="p14">
+        <mc:AlternateContent xmlns:mc="http://schemas.openxmlformats.org/markup-compatibility/2006" xmlns:p14="http://schemas.microsoft.com/office/powerpoint/2010/main">
+          <mc:Choice Requires="p14">
             <p:contentPart p14:bwMode="auto" r:id="rId17">
               <p14:nvContentPartPr>
                 <p14:cNvPr id="19" name="Ink 18">
@@ -6841,7 +6870,7 @@
               </p14:xfrm>
             </p:contentPart>
           </mc:Choice>
-          <mc:Fallback>
+          <mc:Fallback xmlns="">
             <p:pic>
               <p:nvPicPr>
                 <p:cNvPr id="19" name="Ink 18">
@@ -6872,8 +6901,8 @@
             </p:pic>
           </mc:Fallback>
         </mc:AlternateContent>
-        <mc:AlternateContent xmlns:mc="http://schemas.openxmlformats.org/markup-compatibility/2006">
-          <mc:Choice xmlns:p14="http://schemas.microsoft.com/office/powerpoint/2010/main" Requires="p14">
+        <mc:AlternateContent xmlns:mc="http://schemas.openxmlformats.org/markup-compatibility/2006" xmlns:p14="http://schemas.microsoft.com/office/powerpoint/2010/main">
+          <mc:Choice Requires="p14">
             <p:contentPart p14:bwMode="auto" r:id="rId19">
               <p14:nvContentPartPr>
                 <p14:cNvPr id="20" name="Ink 19">
@@ -6892,7 +6921,7 @@
               </p14:xfrm>
             </p:contentPart>
           </mc:Choice>
-          <mc:Fallback>
+          <mc:Fallback xmlns="">
             <p:pic>
               <p:nvPicPr>
                 <p:cNvPr id="20" name="Ink 19">
@@ -6923,8 +6952,8 @@
             </p:pic>
           </mc:Fallback>
         </mc:AlternateContent>
-        <mc:AlternateContent xmlns:mc="http://schemas.openxmlformats.org/markup-compatibility/2006">
-          <mc:Choice xmlns:p14="http://schemas.microsoft.com/office/powerpoint/2010/main" Requires="p14">
+        <mc:AlternateContent xmlns:mc="http://schemas.openxmlformats.org/markup-compatibility/2006" xmlns:p14="http://schemas.microsoft.com/office/powerpoint/2010/main">
+          <mc:Choice Requires="p14">
             <p:contentPart p14:bwMode="auto" r:id="rId21">
               <p14:nvContentPartPr>
                 <p14:cNvPr id="25" name="Ink 24">
@@ -6943,7 +6972,7 @@
               </p14:xfrm>
             </p:contentPart>
           </mc:Choice>
-          <mc:Fallback>
+          <mc:Fallback xmlns="">
             <p:pic>
               <p:nvPicPr>
                 <p:cNvPr id="25" name="Ink 24">
@@ -6974,8 +7003,8 @@
             </p:pic>
           </mc:Fallback>
         </mc:AlternateContent>
-        <mc:AlternateContent xmlns:mc="http://schemas.openxmlformats.org/markup-compatibility/2006">
-          <mc:Choice xmlns:p14="http://schemas.microsoft.com/office/powerpoint/2010/main" Requires="p14">
+        <mc:AlternateContent xmlns:mc="http://schemas.openxmlformats.org/markup-compatibility/2006" xmlns:p14="http://schemas.microsoft.com/office/powerpoint/2010/main">
+          <mc:Choice Requires="p14">
             <p:contentPart p14:bwMode="auto" r:id="rId23">
               <p14:nvContentPartPr>
                 <p14:cNvPr id="26" name="Ink 25">
@@ -6994,7 +7023,7 @@
               </p14:xfrm>
             </p:contentPart>
           </mc:Choice>
-          <mc:Fallback>
+          <mc:Fallback xmlns="">
             <p:pic>
               <p:nvPicPr>
                 <p:cNvPr id="26" name="Ink 25">
@@ -7026,8 +7055,8 @@
           </mc:Fallback>
         </mc:AlternateContent>
       </p:grpSp>
-      <mc:AlternateContent xmlns:mc="http://schemas.openxmlformats.org/markup-compatibility/2006">
-        <mc:Choice xmlns:p14="http://schemas.microsoft.com/office/powerpoint/2010/main" Requires="p14">
+      <mc:AlternateContent xmlns:mc="http://schemas.openxmlformats.org/markup-compatibility/2006" xmlns:p14="http://schemas.microsoft.com/office/powerpoint/2010/main">
+        <mc:Choice Requires="p14">
           <p:contentPart p14:bwMode="auto" r:id="rId25">
             <p14:nvContentPartPr>
               <p14:cNvPr id="31" name="Ink 30">
@@ -7046,7 +7075,7 @@
             </p14:xfrm>
           </p:contentPart>
         </mc:Choice>
-        <mc:Fallback>
+        <mc:Fallback xmlns="">
           <p:pic>
             <p:nvPicPr>
               <p:cNvPr id="31" name="Ink 30">
@@ -7077,8 +7106,8 @@
           </p:pic>
         </mc:Fallback>
       </mc:AlternateContent>
-      <mc:AlternateContent xmlns:mc="http://schemas.openxmlformats.org/markup-compatibility/2006">
-        <mc:Choice xmlns:p14="http://schemas.microsoft.com/office/powerpoint/2010/main" Requires="p14">
+      <mc:AlternateContent xmlns:mc="http://schemas.openxmlformats.org/markup-compatibility/2006" xmlns:p14="http://schemas.microsoft.com/office/powerpoint/2010/main">
+        <mc:Choice Requires="p14">
           <p:contentPart p14:bwMode="auto" r:id="rId27">
             <p14:nvContentPartPr>
               <p14:cNvPr id="35" name="Ink 34">
@@ -7097,7 +7126,7 @@
             </p14:xfrm>
           </p:contentPart>
         </mc:Choice>
-        <mc:Fallback>
+        <mc:Fallback xmlns="">
           <p:pic>
             <p:nvPicPr>
               <p:cNvPr id="35" name="Ink 34">
@@ -7128,8 +7157,8 @@
           </p:pic>
         </mc:Fallback>
       </mc:AlternateContent>
-      <mc:AlternateContent xmlns:mc="http://schemas.openxmlformats.org/markup-compatibility/2006">
-        <mc:Choice xmlns:p14="http://schemas.microsoft.com/office/powerpoint/2010/main" Requires="p14">
+      <mc:AlternateContent xmlns:mc="http://schemas.openxmlformats.org/markup-compatibility/2006" xmlns:p14="http://schemas.microsoft.com/office/powerpoint/2010/main">
+        <mc:Choice Requires="p14">
           <p:contentPart p14:bwMode="auto" r:id="rId29">
             <p14:nvContentPartPr>
               <p14:cNvPr id="36" name="Ink 35">
@@ -7148,7 +7177,7 @@
             </p14:xfrm>
           </p:contentPart>
         </mc:Choice>
-        <mc:Fallback>
+        <mc:Fallback xmlns="">
           <p:pic>
             <p:nvPicPr>
               <p:cNvPr id="36" name="Ink 35">
@@ -7179,8 +7208,8 @@
           </p:pic>
         </mc:Fallback>
       </mc:AlternateContent>
-      <mc:AlternateContent xmlns:mc="http://schemas.openxmlformats.org/markup-compatibility/2006">
-        <mc:Choice xmlns:p14="http://schemas.microsoft.com/office/powerpoint/2010/main" Requires="p14">
+      <mc:AlternateContent xmlns:mc="http://schemas.openxmlformats.org/markup-compatibility/2006" xmlns:p14="http://schemas.microsoft.com/office/powerpoint/2010/main">
+        <mc:Choice Requires="p14">
           <p:contentPart p14:bwMode="auto" r:id="rId31">
             <p14:nvContentPartPr>
               <p14:cNvPr id="38" name="Ink 37">
@@ -7199,7 +7228,7 @@
             </p14:xfrm>
           </p:contentPart>
         </mc:Choice>
-        <mc:Fallback>
+        <mc:Fallback xmlns="">
           <p:pic>
             <p:nvPicPr>
               <p:cNvPr id="38" name="Ink 37">
@@ -7271,7 +7300,7 @@
             </p:blipFill>
             <p:spPr>
               <a:xfrm>
-                <a:off x="6586677" y="3756123"/>
+                <a:off x="6586677" y="3755763"/>
                 <a:ext cx="235800" cy="250560"/>
               </a:xfrm>
               <a:prstGeom prst="rect">
@@ -7322,7 +7351,7 @@
             </p:blipFill>
             <p:spPr>
               <a:xfrm>
-                <a:off x="7683237" y="3742083"/>
+                <a:off x="7682877" y="3742083"/>
                 <a:ext cx="216000" cy="257760"/>
               </a:xfrm>
               <a:prstGeom prst="rect">
@@ -7373,8 +7402,8 @@
             </p:blipFill>
             <p:spPr>
               <a:xfrm>
-                <a:off x="8295597" y="3729123"/>
-                <a:ext cx="243360" cy="275760"/>
+                <a:off x="8295597" y="3728112"/>
+                <a:ext cx="243360" cy="277059"/>
               </a:xfrm>
               <a:prstGeom prst="rect">
                 <a:avLst/>
@@ -7424,7 +7453,7 @@
             </p:blipFill>
             <p:spPr>
               <a:xfrm>
-                <a:off x="9522837" y="3732003"/>
+                <a:off x="9522837" y="3731643"/>
                 <a:ext cx="229320" cy="257760"/>
               </a:xfrm>
               <a:prstGeom prst="rect">
@@ -7475,8 +7504,8 @@
             </p:blipFill>
             <p:spPr>
               <a:xfrm>
-                <a:off x="10399437" y="3721563"/>
-                <a:ext cx="248400" cy="291240"/>
+                <a:off x="10399437" y="3720686"/>
+                <a:ext cx="248400" cy="292272"/>
               </a:xfrm>
               <a:prstGeom prst="rect">
                 <a:avLst/>
@@ -7577,7 +7606,7 @@
             </p:blipFill>
             <p:spPr>
               <a:xfrm>
-                <a:off x="7364277" y="3034683"/>
+                <a:off x="7363917" y="3034683"/>
                 <a:ext cx="262800" cy="253080"/>
               </a:xfrm>
               <a:prstGeom prst="rect">
@@ -7628,7 +7657,7 @@
             </p:blipFill>
             <p:spPr>
               <a:xfrm>
-                <a:off x="7994277" y="3002283"/>
+                <a:off x="7993917" y="3002283"/>
                 <a:ext cx="231480" cy="283320"/>
               </a:xfrm>
               <a:prstGeom prst="rect">
@@ -7679,7 +7708,7 @@
             </p:blipFill>
             <p:spPr>
               <a:xfrm>
-                <a:off x="8650197" y="3025683"/>
+                <a:off x="8649837" y="3025683"/>
                 <a:ext cx="232200" cy="230760"/>
               </a:xfrm>
               <a:prstGeom prst="rect">
@@ -7704,7 +7733,7 @@
         <p:spPr>
           <a:xfrm>
             <a:off x="7471316" y="2546362"/>
-            <a:ext cx="1153201" cy="369332"/>
+            <a:ext cx="1229824" cy="369332"/>
           </a:xfrm>
           <a:prstGeom prst="rect">
             <a:avLst/>
@@ -7720,8 +7749,10 @@
             <a:r>
               <a:rPr lang="en-US" b="1" dirty="0">
                 <a:solidFill>
-                  <a:srgbClr val="002060"/>
+                  <a:srgbClr val="347FB5"/>
                 </a:solidFill>
+                <a:latin typeface="Source Sans Pro" panose="020B0503030403020204" pitchFamily="34" charset="0"/>
+                <a:ea typeface="Source Sans Pro" panose="020B0503030403020204" pitchFamily="34" charset="0"/>
               </a:rPr>
               <a:t>Your work</a:t>
             </a:r>
@@ -7743,7 +7774,7 @@
         <p:spPr>
           <a:xfrm>
             <a:off x="8076001" y="4605737"/>
-            <a:ext cx="2189574" cy="369332"/>
+            <a:ext cx="2337499" cy="369332"/>
           </a:xfrm>
           <a:prstGeom prst="rect">
             <a:avLst/>
@@ -7759,8 +7790,10 @@
             <a:r>
               <a:rPr lang="en-US" b="1" dirty="0">
                 <a:solidFill>
-                  <a:srgbClr val="FF0000"/>
+                  <a:srgbClr val="C93431"/>
                 </a:solidFill>
+                <a:latin typeface="Source Sans Pro" panose="020B0503030403020204" pitchFamily="34" charset="0"/>
+                <a:ea typeface="Source Sans Pro" panose="020B0503030403020204" pitchFamily="34" charset="0"/>
               </a:rPr>
               <a:t>Someone else’s work</a:t>
             </a:r>
@@ -7782,7 +7815,7 @@
         <p:spPr>
           <a:xfrm>
             <a:off x="5987516" y="4091797"/>
-            <a:ext cx="1369349" cy="369332"/>
+            <a:ext cx="1441420" cy="369332"/>
           </a:xfrm>
           <a:prstGeom prst="rect">
             <a:avLst/>
@@ -7796,10 +7829,12 @@
           <a:lstStyle/>
           <a:p>
             <a:r>
-              <a:rPr lang="en-US" dirty="0">
+              <a:rPr lang="en-US" b="1" dirty="0">
                 <a:solidFill>
-                  <a:srgbClr val="00B050"/>
+                  <a:srgbClr val="7D943C"/>
                 </a:solidFill>
+                <a:latin typeface="Source Sans Pro" panose="020B0503030403020204" pitchFamily="34" charset="0"/>
+                <a:ea typeface="Source Sans Pro" panose="020B0503030403020204" pitchFamily="34" charset="0"/>
               </a:rPr>
               <a:t>Main branch</a:t>
             </a:r>
@@ -7826,8 +7861,8 @@
             <a:chExt cx="179640" cy="176400"/>
           </a:xfrm>
         </p:grpSpPr>
-        <mc:AlternateContent xmlns:mc="http://schemas.openxmlformats.org/markup-compatibility/2006">
-          <mc:Choice xmlns:p14="http://schemas.microsoft.com/office/powerpoint/2010/main" Requires="p14">
+        <mc:AlternateContent xmlns:mc="http://schemas.openxmlformats.org/markup-compatibility/2006" xmlns:p14="http://schemas.microsoft.com/office/powerpoint/2010/main">
+          <mc:Choice Requires="p14">
             <p:contentPart p14:bwMode="auto" r:id="rId51">
               <p14:nvContentPartPr>
                 <p14:cNvPr id="52" name="Ink 51">
@@ -7846,7 +7881,7 @@
               </p14:xfrm>
             </p:contentPart>
           </mc:Choice>
-          <mc:Fallback>
+          <mc:Fallback xmlns="">
             <p:pic>
               <p:nvPicPr>
                 <p:cNvPr id="52" name="Ink 51">
@@ -7877,8 +7912,8 @@
             </p:pic>
           </mc:Fallback>
         </mc:AlternateContent>
-        <mc:AlternateContent xmlns:mc="http://schemas.openxmlformats.org/markup-compatibility/2006">
-          <mc:Choice xmlns:p14="http://schemas.microsoft.com/office/powerpoint/2010/main" Requires="p14">
+        <mc:AlternateContent xmlns:mc="http://schemas.openxmlformats.org/markup-compatibility/2006" xmlns:p14="http://schemas.microsoft.com/office/powerpoint/2010/main">
+          <mc:Choice Requires="p14">
             <p:contentPart p14:bwMode="auto" r:id="rId53">
               <p14:nvContentPartPr>
                 <p14:cNvPr id="53" name="Ink 52">
@@ -7897,7 +7932,7 @@
               </p14:xfrm>
             </p:contentPart>
           </mc:Choice>
-          <mc:Fallback>
+          <mc:Fallback xmlns="">
             <p:pic>
               <p:nvPicPr>
                 <p:cNvPr id="53" name="Ink 52">
@@ -7944,7 +7979,7 @@
         <p:spPr>
           <a:xfrm>
             <a:off x="5864669" y="2917683"/>
-            <a:ext cx="1049982" cy="523220"/>
+            <a:ext cx="1049982" cy="738664"/>
           </a:xfrm>
           <a:prstGeom prst="rect">
             <a:avLst/>
@@ -7960,7 +7995,7 @@
             <a:pPr algn="r"/>
             <a:r>
               <a:rPr lang="en-US" sz="1400" dirty="0">
-                <a:latin typeface="Times" pitchFamily="2" charset="0"/>
+                <a:latin typeface="ETbb" panose="02000503000000000000" pitchFamily="2" charset="0"/>
               </a:rPr>
               <a:t>Starting a new branch</a:t>
             </a:r>
@@ -7997,15 +8032,15 @@
           <a:p>
             <a:r>
               <a:rPr lang="en-US" sz="1400" dirty="0">
-                <a:latin typeface="Times" pitchFamily="2" charset="0"/>
+                <a:latin typeface="ETbb" panose="02000503000000000000" pitchFamily="2" charset="0"/>
               </a:rPr>
               <a:t>Merging the branch back in to main</a:t>
             </a:r>
           </a:p>
         </p:txBody>
       </p:sp>
-      <mc:AlternateContent xmlns:mc="http://schemas.openxmlformats.org/markup-compatibility/2006">
-        <mc:Choice xmlns:p14="http://schemas.microsoft.com/office/powerpoint/2010/main" Requires="p14">
+      <mc:AlternateContent xmlns:mc="http://schemas.openxmlformats.org/markup-compatibility/2006" xmlns:p14="http://schemas.microsoft.com/office/powerpoint/2010/main">
+        <mc:Choice Requires="p14">
           <p:contentPart p14:bwMode="auto" r:id="rId55">
             <p14:nvContentPartPr>
               <p14:cNvPr id="57" name="Ink 56">
@@ -8024,7 +8059,7 @@
             </p14:xfrm>
           </p:contentPart>
         </mc:Choice>
-        <mc:Fallback>
+        <mc:Fallback xmlns="">
           <p:pic>
             <p:nvPicPr>
               <p:cNvPr id="57" name="Ink 56">
@@ -8075,8 +8110,8 @@
             <a:chExt cx="284040" cy="833040"/>
           </a:xfrm>
         </p:grpSpPr>
-        <mc:AlternateContent xmlns:mc="http://schemas.openxmlformats.org/markup-compatibility/2006">
-          <mc:Choice xmlns:p14="http://schemas.microsoft.com/office/powerpoint/2010/main" Requires="p14">
+        <mc:AlternateContent xmlns:mc="http://schemas.openxmlformats.org/markup-compatibility/2006" xmlns:p14="http://schemas.microsoft.com/office/powerpoint/2010/main">
+          <mc:Choice Requires="p14">
             <p:contentPart p14:bwMode="auto" r:id="rId57">
               <p14:nvContentPartPr>
                 <p14:cNvPr id="58" name="Ink 57">
@@ -8095,7 +8130,7 @@
               </p14:xfrm>
             </p:contentPart>
           </mc:Choice>
-          <mc:Fallback>
+          <mc:Fallback xmlns="">
             <p:pic>
               <p:nvPicPr>
                 <p:cNvPr id="58" name="Ink 57">
@@ -8126,8 +8161,8 @@
             </p:pic>
           </mc:Fallback>
         </mc:AlternateContent>
-        <mc:AlternateContent xmlns:mc="http://schemas.openxmlformats.org/markup-compatibility/2006">
-          <mc:Choice xmlns:p14="http://schemas.microsoft.com/office/powerpoint/2010/main" Requires="p14">
+        <mc:AlternateContent xmlns:mc="http://schemas.openxmlformats.org/markup-compatibility/2006" xmlns:p14="http://schemas.microsoft.com/office/powerpoint/2010/main">
+          <mc:Choice Requires="p14">
             <p:contentPart p14:bwMode="auto" r:id="rId59">
               <p14:nvContentPartPr>
                 <p14:cNvPr id="59" name="Ink 58">
@@ -8146,7 +8181,7 @@
               </p14:xfrm>
             </p:contentPart>
           </mc:Choice>
-          <mc:Fallback>
+          <mc:Fallback xmlns="">
             <p:pic>
               <p:nvPicPr>
                 <p:cNvPr id="59" name="Ink 58">
@@ -8209,7 +8244,7 @@
             <a:pPr algn="ctr"/>
             <a:r>
               <a:rPr lang="en-US" sz="1400" dirty="0">
-                <a:latin typeface="Times" pitchFamily="2" charset="0"/>
+                <a:latin typeface="ETbb" panose="02000503000000000000" pitchFamily="2" charset="0"/>
               </a:rPr>
               <a:t>A single commit on the main branch</a:t>
             </a:r>
@@ -8290,8 +8325,8 @@
         </p:nvSpPr>
         <p:spPr>
           <a:xfrm>
-            <a:off x="7471760" y="3521385"/>
-            <a:ext cx="2286000" cy="2308324"/>
+            <a:off x="8072272" y="3521385"/>
+            <a:ext cx="3457932" cy="1323439"/>
           </a:xfrm>
           <a:prstGeom prst="rect">
             <a:avLst/>
@@ -8305,53 +8340,58 @@
           <a:lstStyle/>
           <a:p>
             <a:r>
-              <a:rPr lang="en-US" sz="1600" b="1" dirty="0"/>
+              <a:rPr lang="en-US" sz="1600" b="1" dirty="0">
+                <a:latin typeface="ETbb" panose="02000503000000000000" pitchFamily="2" charset="0"/>
+                <a:ea typeface="Source Sans Pro" panose="020B0503030403020204" pitchFamily="34" charset="0"/>
+              </a:rPr>
               <a:t>How to share?</a:t>
             </a:r>
           </a:p>
           <a:p>
-            <a:endParaRPr lang="en-US" sz="1600" b="1" dirty="0"/>
-          </a:p>
-          <a:p>
             <a:pPr marL="285750" indent="-285750">
-              <a:buFont typeface="Arial" panose="020B0604020202020204" pitchFamily="34" charset="0"/>
-              <a:buChar char="•"/>
+              <a:buFont typeface="Helvetica Neue" panose="02000503000000020004" pitchFamily="2" charset="0"/>
+              <a:buChar char="—"/>
             </a:pPr>
             <a:r>
-              <a:rPr lang="en-US" sz="1600" dirty="0"/>
+              <a:rPr lang="en-US" sz="1600" dirty="0">
+                <a:latin typeface="ETbb" panose="02000503000000000000" pitchFamily="2" charset="0"/>
+                <a:ea typeface="Source Sans Pro" panose="020B0503030403020204" pitchFamily="34" charset="0"/>
+              </a:rPr>
               <a:t>Select a FAIR repository</a:t>
             </a:r>
           </a:p>
           <a:p>
+            <a:r>
+              <a:rPr lang="en-US" sz="1600" dirty="0">
+                <a:latin typeface="ETbb" panose="02000503000000000000" pitchFamily="2" charset="0"/>
+                <a:ea typeface="Source Sans Pro" panose="020B0503030403020204" pitchFamily="34" charset="0"/>
+              </a:rPr>
+              <a:t>Check for…</a:t>
+            </a:r>
+          </a:p>
+          <a:p>
             <a:pPr marL="285750" indent="-285750">
-              <a:buFont typeface="Arial" panose="020B0604020202020204" pitchFamily="34" charset="0"/>
-              <a:buChar char="•"/>
+              <a:buFont typeface="Helvetica Neue" panose="02000503000000020004" pitchFamily="2" charset="0"/>
+              <a:buChar char="—"/>
             </a:pPr>
-            <a:endParaRPr lang="en-US" sz="1600" dirty="0"/>
-          </a:p>
-          <a:p>
-            <a:r>
-              <a:rPr lang="en-US" sz="1600" dirty="0"/>
-              <a:t>Check for…</a:t>
+            <a:r>
+              <a:rPr lang="en-US" sz="1600" dirty="0">
+                <a:latin typeface="ETbb" panose="02000503000000000000" pitchFamily="2" charset="0"/>
+                <a:ea typeface="Source Sans Pro" panose="020B0503030403020204" pitchFamily="34" charset="0"/>
+              </a:rPr>
+              <a:t>Access controls for sensitive data</a:t>
             </a:r>
           </a:p>
           <a:p>
             <a:pPr marL="285750" indent="-285750">
-              <a:buFont typeface="Arial" panose="020B0604020202020204" pitchFamily="34" charset="0"/>
-              <a:buChar char="•"/>
+              <a:buFont typeface="Helvetica Neue" panose="02000503000000020004" pitchFamily="2" charset="0"/>
+              <a:buChar char="—"/>
             </a:pPr>
             <a:r>
-              <a:rPr lang="en-US" sz="1600" dirty="0"/>
-              <a:t>Access controls for sensitive data</a:t>
-            </a:r>
-          </a:p>
-          <a:p>
-            <a:pPr marL="285750" indent="-285750">
-              <a:buFont typeface="Arial" panose="020B0604020202020204" pitchFamily="34" charset="0"/>
-              <a:buChar char="•"/>
-            </a:pPr>
-            <a:r>
-              <a:rPr lang="en-US" sz="1600" dirty="0"/>
+              <a:rPr lang="en-US" sz="1600" dirty="0">
+                <a:latin typeface="ETbb" panose="02000503000000000000" pitchFamily="2" charset="0"/>
+                <a:ea typeface="Source Sans Pro" panose="020B0503030403020204" pitchFamily="34" charset="0"/>
+              </a:rPr>
               <a:t>Size restrictions</a:t>
             </a:r>
           </a:p>
@@ -8371,8 +8411,8 @@
         </p:nvSpPr>
         <p:spPr>
           <a:xfrm>
-            <a:off x="361978" y="3521385"/>
-            <a:ext cx="2286000" cy="2554545"/>
+            <a:off x="162641" y="3521385"/>
+            <a:ext cx="2374451" cy="1815882"/>
           </a:xfrm>
           <a:prstGeom prst="rect">
             <a:avLst/>
@@ -8386,66 +8426,88 @@
           <a:lstStyle/>
           <a:p>
             <a:r>
-              <a:rPr lang="en-US" sz="1600" b="1" dirty="0"/>
-              <a:t>Can you share / must you share? </a:t>
-            </a:r>
-          </a:p>
-          <a:p>
-            <a:endParaRPr lang="en-US" sz="1600" dirty="0"/>
-          </a:p>
-          <a:p>
-            <a:r>
-              <a:rPr lang="en-US" sz="1600" dirty="0"/>
+              <a:rPr lang="en-US" sz="1600" b="1" dirty="0">
+                <a:latin typeface="ETbb" panose="02000503000000000000" pitchFamily="2" charset="0"/>
+                <a:ea typeface="Source Sans Pro" panose="020B0503030403020204" pitchFamily="34" charset="0"/>
+              </a:rPr>
+              <a:t>Can/must you share? </a:t>
+            </a:r>
+            <a:endParaRPr lang="en-US" sz="1600" dirty="0">
+              <a:latin typeface="ETbb" panose="02000503000000000000" pitchFamily="2" charset="0"/>
+              <a:ea typeface="Source Sans Pro" panose="020B0503030403020204" pitchFamily="34" charset="0"/>
+            </a:endParaRPr>
+          </a:p>
+          <a:p>
+            <a:r>
+              <a:rPr lang="en-US" sz="1600" dirty="0">
+                <a:latin typeface="ETbb" panose="02000503000000000000" pitchFamily="2" charset="0"/>
+                <a:ea typeface="Source Sans Pro" panose="020B0503030403020204" pitchFamily="34" charset="0"/>
+              </a:rPr>
               <a:t>Check with…</a:t>
             </a:r>
           </a:p>
           <a:p>
             <a:pPr marL="342900" indent="-342900">
-              <a:buFont typeface="Arial" panose="020B0604020202020204" pitchFamily="34" charset="0"/>
-              <a:buChar char="•"/>
+              <a:buFont typeface="System Font Regular"/>
+              <a:buChar char="—"/>
             </a:pPr>
             <a:r>
-              <a:rPr lang="en-US" sz="1600" dirty="0"/>
+              <a:rPr lang="en-US" sz="1600" dirty="0">
+                <a:latin typeface="ETbb" panose="02000503000000000000" pitchFamily="2" charset="0"/>
+                <a:ea typeface="Source Sans Pro" panose="020B0503030403020204" pitchFamily="34" charset="0"/>
+              </a:rPr>
               <a:t>Collaborators</a:t>
             </a:r>
           </a:p>
           <a:p>
             <a:pPr marL="342900" indent="-342900">
-              <a:buFont typeface="Arial" panose="020B0604020202020204" pitchFamily="34" charset="0"/>
-              <a:buChar char="•"/>
+              <a:buFont typeface="System Font Regular"/>
+              <a:buChar char="—"/>
             </a:pPr>
             <a:r>
-              <a:rPr lang="en-US" sz="1600" dirty="0"/>
+              <a:rPr lang="en-US" sz="1600" dirty="0">
+                <a:latin typeface="ETbb" panose="02000503000000000000" pitchFamily="2" charset="0"/>
+                <a:ea typeface="Source Sans Pro" panose="020B0503030403020204" pitchFamily="34" charset="0"/>
+              </a:rPr>
               <a:t>Ethics Review Board</a:t>
             </a:r>
           </a:p>
           <a:p>
             <a:pPr marL="342900" indent="-342900">
-              <a:buFont typeface="Arial" panose="020B0604020202020204" pitchFamily="34" charset="0"/>
-              <a:buChar char="•"/>
+              <a:buFont typeface="System Font Regular"/>
+              <a:buChar char="—"/>
             </a:pPr>
             <a:r>
-              <a:rPr lang="en-US" sz="1600" dirty="0"/>
-              <a:t>Contracts or data use agreements</a:t>
+              <a:rPr lang="en-US" sz="1600" dirty="0">
+                <a:latin typeface="ETbb" panose="02000503000000000000" pitchFamily="2" charset="0"/>
+                <a:ea typeface="Source Sans Pro" panose="020B0503030403020204" pitchFamily="34" charset="0"/>
+              </a:rPr>
+              <a:t>Data use agreements</a:t>
             </a:r>
           </a:p>
           <a:p>
             <a:pPr marL="342900" indent="-342900">
-              <a:buFont typeface="Arial" panose="020B0604020202020204" pitchFamily="34" charset="0"/>
-              <a:buChar char="•"/>
+              <a:buFont typeface="System Font Regular"/>
+              <a:buChar char="—"/>
             </a:pPr>
             <a:r>
-              <a:rPr lang="en-US" sz="1600" dirty="0"/>
+              <a:rPr lang="en-US" sz="1600" dirty="0">
+                <a:latin typeface="ETbb" panose="02000503000000000000" pitchFamily="2" charset="0"/>
+                <a:ea typeface="Source Sans Pro" panose="020B0503030403020204" pitchFamily="34" charset="0"/>
+              </a:rPr>
               <a:t>Journal</a:t>
             </a:r>
           </a:p>
           <a:p>
             <a:pPr marL="342900" indent="-342900">
-              <a:buFont typeface="Arial" panose="020B0604020202020204" pitchFamily="34" charset="0"/>
-              <a:buChar char="•"/>
+              <a:buFont typeface="System Font Regular"/>
+              <a:buChar char="—"/>
             </a:pPr>
             <a:r>
-              <a:rPr lang="en-US" sz="1600" dirty="0"/>
+              <a:rPr lang="en-US" sz="1600" dirty="0">
+                <a:latin typeface="ETbb" panose="02000503000000000000" pitchFamily="2" charset="0"/>
+                <a:ea typeface="Source Sans Pro" panose="020B0503030403020204" pitchFamily="34" charset="0"/>
+              </a:rPr>
               <a:t>Funders</a:t>
             </a:r>
           </a:p>
@@ -8466,7 +8528,7 @@
         <p:spPr>
           <a:xfrm>
             <a:off x="2731905" y="3521385"/>
-            <a:ext cx="2286000" cy="2062103"/>
+            <a:ext cx="2286000" cy="1815882"/>
           </a:xfrm>
           <a:prstGeom prst="rect">
             <a:avLst/>
@@ -8480,70 +8542,88 @@
           <a:lstStyle/>
           <a:p>
             <a:r>
-              <a:rPr lang="en-US" sz="1600" b="1" dirty="0"/>
-              <a:t>What can you share?</a:t>
-            </a:r>
-          </a:p>
-          <a:p>
-            <a:endParaRPr lang="en-US" sz="1600" b="1" dirty="0"/>
+              <a:rPr lang="en-US" sz="1600" b="1" dirty="0">
+                <a:latin typeface="ETbb" panose="02000503000000000000" pitchFamily="2" charset="0"/>
+                <a:ea typeface="Source Sans Pro" panose="020B0503030403020204" pitchFamily="34" charset="0"/>
+              </a:rPr>
+              <a:t>What to share?</a:t>
+            </a:r>
           </a:p>
           <a:p>
             <a:pPr marL="342900" indent="-342900">
-              <a:buFont typeface="Arial" panose="020B0604020202020204" pitchFamily="34" charset="0"/>
-              <a:buChar char="•"/>
+              <a:buFont typeface="Helvetica Neue" panose="02000503000000020004" pitchFamily="2" charset="0"/>
+              <a:buChar char="—"/>
             </a:pPr>
             <a:r>
-              <a:rPr lang="en-US" sz="1600" dirty="0"/>
+              <a:rPr lang="en-US" sz="1600" dirty="0">
+                <a:latin typeface="ETbb" panose="02000503000000000000" pitchFamily="2" charset="0"/>
+                <a:ea typeface="Source Sans Pro" panose="020B0503030403020204" pitchFamily="34" charset="0"/>
+              </a:rPr>
               <a:t>Study protocol</a:t>
             </a:r>
           </a:p>
           <a:p>
             <a:pPr marL="342900" indent="-342900">
-              <a:buFont typeface="Arial" panose="020B0604020202020204" pitchFamily="34" charset="0"/>
-              <a:buChar char="•"/>
+              <a:buFont typeface="Helvetica Neue" panose="02000503000000020004" pitchFamily="2" charset="0"/>
+              <a:buChar char="—"/>
             </a:pPr>
             <a:r>
-              <a:rPr lang="en-US" sz="1600" dirty="0"/>
+              <a:rPr lang="en-US" sz="1600" dirty="0">
+                <a:latin typeface="ETbb" panose="02000503000000000000" pitchFamily="2" charset="0"/>
+                <a:ea typeface="Source Sans Pro" panose="020B0503030403020204" pitchFamily="34" charset="0"/>
+              </a:rPr>
               <a:t>Materials</a:t>
             </a:r>
           </a:p>
           <a:p>
             <a:pPr marL="342900" indent="-342900">
-              <a:buFont typeface="Arial" panose="020B0604020202020204" pitchFamily="34" charset="0"/>
-              <a:buChar char="•"/>
+              <a:buFont typeface="Helvetica Neue" panose="02000503000000020004" pitchFamily="2" charset="0"/>
+              <a:buChar char="—"/>
             </a:pPr>
             <a:r>
-              <a:rPr lang="en-US" sz="1600" dirty="0"/>
+              <a:rPr lang="en-US" sz="1600" dirty="0">
+                <a:latin typeface="ETbb" panose="02000503000000000000" pitchFamily="2" charset="0"/>
+                <a:ea typeface="Source Sans Pro" panose="020B0503030403020204" pitchFamily="34" charset="0"/>
+              </a:rPr>
               <a:t>Raw data</a:t>
             </a:r>
           </a:p>
           <a:p>
             <a:pPr marL="342900" indent="-342900">
-              <a:buFont typeface="Arial" panose="020B0604020202020204" pitchFamily="34" charset="0"/>
-              <a:buChar char="•"/>
+              <a:buFont typeface="Helvetica Neue" panose="02000503000000020004" pitchFamily="2" charset="0"/>
+              <a:buChar char="—"/>
             </a:pPr>
             <a:r>
-              <a:rPr lang="en-US" sz="1600" dirty="0"/>
+              <a:rPr lang="en-US" sz="1600" dirty="0">
+                <a:latin typeface="ETbb" panose="02000503000000000000" pitchFamily="2" charset="0"/>
+                <a:ea typeface="Source Sans Pro" panose="020B0503030403020204" pitchFamily="34" charset="0"/>
+              </a:rPr>
               <a:t>Documentation</a:t>
             </a:r>
           </a:p>
           <a:p>
             <a:pPr marL="342900" indent="-342900">
-              <a:buFont typeface="Arial" panose="020B0604020202020204" pitchFamily="34" charset="0"/>
-              <a:buChar char="•"/>
+              <a:buFont typeface="Helvetica Neue" panose="02000503000000020004" pitchFamily="2" charset="0"/>
+              <a:buChar char="—"/>
             </a:pPr>
             <a:r>
-              <a:rPr lang="en-US" sz="1600" dirty="0"/>
+              <a:rPr lang="en-US" sz="1600" dirty="0">
+                <a:latin typeface="ETbb" panose="02000503000000000000" pitchFamily="2" charset="0"/>
+                <a:ea typeface="Source Sans Pro" panose="020B0503030403020204" pitchFamily="34" charset="0"/>
+              </a:rPr>
               <a:t>Analysis scripts</a:t>
             </a:r>
           </a:p>
           <a:p>
             <a:pPr marL="342900" indent="-342900">
-              <a:buFont typeface="Arial" panose="020B0604020202020204" pitchFamily="34" charset="0"/>
-              <a:buChar char="•"/>
+              <a:buFont typeface="Helvetica Neue" panose="02000503000000020004" pitchFamily="2" charset="0"/>
+              <a:buChar char="—"/>
             </a:pPr>
             <a:r>
-              <a:rPr lang="en-US" sz="1600" dirty="0"/>
+              <a:rPr lang="en-US" sz="1600" dirty="0">
+                <a:latin typeface="ETbb" panose="02000503000000000000" pitchFamily="2" charset="0"/>
+                <a:ea typeface="Source Sans Pro" panose="020B0503030403020204" pitchFamily="34" charset="0"/>
+              </a:rPr>
               <a:t>Research reports</a:t>
             </a:r>
           </a:p>
@@ -8563,8 +8643,8 @@
         </p:nvSpPr>
         <p:spPr>
           <a:xfrm>
-            <a:off x="5101832" y="3525847"/>
-            <a:ext cx="2286000" cy="2554545"/>
+            <a:off x="5023186" y="3525847"/>
+            <a:ext cx="2839806" cy="1323439"/>
           </a:xfrm>
           <a:prstGeom prst="rect">
             <a:avLst/>
@@ -8578,50 +8658,62 @@
           <a:lstStyle/>
           <a:p>
             <a:r>
-              <a:rPr lang="en-US" sz="1600" b="1" dirty="0"/>
+              <a:rPr lang="en-US" sz="1600" b="1" dirty="0">
+                <a:latin typeface="ETbb" panose="02000503000000000000" pitchFamily="2" charset="0"/>
+                <a:ea typeface="Source Sans Pro" panose="020B0503030403020204" pitchFamily="34" charset="0"/>
+              </a:rPr>
               <a:t>When to share?</a:t>
             </a:r>
           </a:p>
           <a:p>
-            <a:endParaRPr lang="en-US" sz="1600" b="1" dirty="0"/>
-          </a:p>
-          <a:p>
             <a:pPr marL="342900" indent="-342900">
-              <a:buFont typeface="Arial" panose="020B0604020202020204" pitchFamily="34" charset="0"/>
-              <a:buChar char="•"/>
+              <a:buFont typeface="Helvetica Neue" panose="02000503000000020004" pitchFamily="2" charset="0"/>
+              <a:buChar char="—"/>
             </a:pPr>
             <a:r>
-              <a:rPr lang="en-US" sz="1600" dirty="0"/>
+              <a:rPr lang="en-US" sz="1600" dirty="0">
+                <a:latin typeface="ETbb" panose="02000503000000000000" pitchFamily="2" charset="0"/>
+                <a:ea typeface="Source Sans Pro" panose="020B0503030403020204" pitchFamily="34" charset="0"/>
+              </a:rPr>
               <a:t>As data are being collected</a:t>
             </a:r>
           </a:p>
           <a:p>
             <a:pPr marL="342900" indent="-342900">
-              <a:buFont typeface="Arial" panose="020B0604020202020204" pitchFamily="34" charset="0"/>
-              <a:buChar char="•"/>
+              <a:buFont typeface="Helvetica Neue" panose="02000503000000020004" pitchFamily="2" charset="0"/>
+              <a:buChar char="—"/>
             </a:pPr>
             <a:r>
-              <a:rPr lang="en-US" sz="1600" dirty="0"/>
+              <a:rPr lang="en-US" sz="1600" dirty="0">
+                <a:latin typeface="ETbb" panose="02000503000000000000" pitchFamily="2" charset="0"/>
+                <a:ea typeface="Source Sans Pro" panose="020B0503030403020204" pitchFamily="34" charset="0"/>
+              </a:rPr>
               <a:t>When submitting a paper</a:t>
             </a:r>
           </a:p>
           <a:p>
             <a:pPr marL="342900" indent="-342900">
-              <a:buFont typeface="Arial" panose="020B0604020202020204" pitchFamily="34" charset="0"/>
-              <a:buChar char="•"/>
+              <a:buFont typeface="Helvetica Neue" panose="02000503000000020004" pitchFamily="2" charset="0"/>
+              <a:buChar char="—"/>
             </a:pPr>
             <a:r>
-              <a:rPr lang="en-US" sz="1600" dirty="0"/>
-              <a:t>When the paper is published</a:t>
+              <a:rPr lang="en-US" sz="1600" dirty="0">
+                <a:latin typeface="ETbb" panose="02000503000000000000" pitchFamily="2" charset="0"/>
+                <a:ea typeface="Source Sans Pro" panose="020B0503030403020204" pitchFamily="34" charset="0"/>
+              </a:rPr>
+              <a:t>When the paper published</a:t>
             </a:r>
           </a:p>
           <a:p>
             <a:pPr marL="342900" indent="-342900">
-              <a:buFont typeface="Arial" panose="020B0604020202020204" pitchFamily="34" charset="0"/>
-              <a:buChar char="•"/>
+              <a:buFont typeface="Helvetica Neue" panose="02000503000000020004" pitchFamily="2" charset="0"/>
+              <a:buChar char="—"/>
             </a:pPr>
             <a:r>
-              <a:rPr lang="en-US" sz="1600" dirty="0"/>
+              <a:rPr lang="en-US" sz="1600" dirty="0">
+                <a:latin typeface="ETbb" panose="02000503000000000000" pitchFamily="2" charset="0"/>
+                <a:ea typeface="Source Sans Pro" panose="020B0503030403020204" pitchFamily="34" charset="0"/>
+              </a:rPr>
               <a:t>After an embargo period</a:t>
             </a:r>
           </a:p>
@@ -8641,14 +8733,14 @@
         </p:nvGrpSpPr>
         <p:grpSpPr>
           <a:xfrm>
-            <a:off x="2386816" y="3682879"/>
+            <a:off x="2290793" y="3613167"/>
             <a:ext cx="326160" cy="183600"/>
             <a:chOff x="2386816" y="3682879"/>
             <a:chExt cx="326160" cy="183600"/>
           </a:xfrm>
         </p:grpSpPr>
-        <mc:AlternateContent xmlns:mc="http://schemas.openxmlformats.org/markup-compatibility/2006">
-          <mc:Choice xmlns:p14="http://schemas.microsoft.com/office/powerpoint/2010/main" Requires="p14">
+        <mc:AlternateContent xmlns:mc="http://schemas.openxmlformats.org/markup-compatibility/2006" xmlns:p14="http://schemas.microsoft.com/office/powerpoint/2010/main">
+          <mc:Choice Requires="p14">
             <p:contentPart p14:bwMode="auto" r:id="rId3">
               <p14:nvContentPartPr>
                 <p14:cNvPr id="18" name="Ink 17">
@@ -8667,7 +8759,7 @@
               </p14:xfrm>
             </p:contentPart>
           </mc:Choice>
-          <mc:Fallback>
+          <mc:Fallback xmlns="">
             <p:pic>
               <p:nvPicPr>
                 <p:cNvPr id="18" name="Ink 17">
@@ -8698,8 +8790,8 @@
             </p:pic>
           </mc:Fallback>
         </mc:AlternateContent>
-        <mc:AlternateContent xmlns:mc="http://schemas.openxmlformats.org/markup-compatibility/2006">
-          <mc:Choice xmlns:p14="http://schemas.microsoft.com/office/powerpoint/2010/main" Requires="p14">
+        <mc:AlternateContent xmlns:mc="http://schemas.openxmlformats.org/markup-compatibility/2006" xmlns:p14="http://schemas.microsoft.com/office/powerpoint/2010/main">
+          <mc:Choice Requires="p14">
             <p:contentPart p14:bwMode="auto" r:id="rId5">
               <p14:nvContentPartPr>
                 <p14:cNvPr id="19" name="Ink 18">
@@ -8718,7 +8810,7 @@
               </p14:xfrm>
             </p:contentPart>
           </mc:Choice>
-          <mc:Fallback>
+          <mc:Fallback xmlns="">
             <p:pic>
               <p:nvPicPr>
                 <p:cNvPr id="19" name="Ink 18">
@@ -8749,8 +8841,8 @@
             </p:pic>
           </mc:Fallback>
         </mc:AlternateContent>
-        <mc:AlternateContent xmlns:mc="http://schemas.openxmlformats.org/markup-compatibility/2006">
-          <mc:Choice xmlns:p14="http://schemas.microsoft.com/office/powerpoint/2010/main" Requires="p14">
+        <mc:AlternateContent xmlns:mc="http://schemas.openxmlformats.org/markup-compatibility/2006" xmlns:p14="http://schemas.microsoft.com/office/powerpoint/2010/main">
+          <mc:Choice Requires="p14">
             <p:contentPart p14:bwMode="auto" r:id="rId7">
               <p14:nvContentPartPr>
                 <p14:cNvPr id="21" name="Ink 20">
@@ -8769,7 +8861,7 @@
               </p14:xfrm>
             </p:contentPart>
           </mc:Choice>
-          <mc:Fallback>
+          <mc:Fallback xmlns="">
             <p:pic>
               <p:nvPicPr>
                 <p:cNvPr id="21" name="Ink 20">
@@ -8815,14 +8907,14 @@
         </p:nvGrpSpPr>
         <p:grpSpPr>
           <a:xfrm>
-            <a:off x="4733708" y="3667759"/>
+            <a:off x="4568764" y="3616351"/>
             <a:ext cx="326160" cy="183600"/>
             <a:chOff x="2386816" y="3682879"/>
             <a:chExt cx="326160" cy="183600"/>
           </a:xfrm>
         </p:grpSpPr>
-        <mc:AlternateContent xmlns:mc="http://schemas.openxmlformats.org/markup-compatibility/2006">
-          <mc:Choice xmlns:p14="http://schemas.microsoft.com/office/powerpoint/2010/main" Requires="p14">
+        <mc:AlternateContent xmlns:mc="http://schemas.openxmlformats.org/markup-compatibility/2006" xmlns:p14="http://schemas.microsoft.com/office/powerpoint/2010/main">
+          <mc:Choice Requires="p14">
             <p:contentPart p14:bwMode="auto" r:id="rId9">
               <p14:nvContentPartPr>
                 <p14:cNvPr id="24" name="Ink 23">
@@ -8841,7 +8933,7 @@
               </p14:xfrm>
             </p:contentPart>
           </mc:Choice>
-          <mc:Fallback>
+          <mc:Fallback xmlns="">
             <p:pic>
               <p:nvPicPr>
                 <p:cNvPr id="24" name="Ink 23">
@@ -8872,8 +8964,8 @@
             </p:pic>
           </mc:Fallback>
         </mc:AlternateContent>
-        <mc:AlternateContent xmlns:mc="http://schemas.openxmlformats.org/markup-compatibility/2006">
-          <mc:Choice xmlns:p14="http://schemas.microsoft.com/office/powerpoint/2010/main" Requires="p14">
+        <mc:AlternateContent xmlns:mc="http://schemas.openxmlformats.org/markup-compatibility/2006" xmlns:p14="http://schemas.microsoft.com/office/powerpoint/2010/main">
+          <mc:Choice Requires="p14">
             <p:contentPart p14:bwMode="auto" r:id="rId10">
               <p14:nvContentPartPr>
                 <p14:cNvPr id="25" name="Ink 24">
@@ -8892,7 +8984,7 @@
               </p14:xfrm>
             </p:contentPart>
           </mc:Choice>
-          <mc:Fallback>
+          <mc:Fallback xmlns="">
             <p:pic>
               <p:nvPicPr>
                 <p:cNvPr id="25" name="Ink 24">
@@ -8923,8 +9015,8 @@
             </p:pic>
           </mc:Fallback>
         </mc:AlternateContent>
-        <mc:AlternateContent xmlns:mc="http://schemas.openxmlformats.org/markup-compatibility/2006">
-          <mc:Choice xmlns:p14="http://schemas.microsoft.com/office/powerpoint/2010/main" Requires="p14">
+        <mc:AlternateContent xmlns:mc="http://schemas.openxmlformats.org/markup-compatibility/2006" xmlns:p14="http://schemas.microsoft.com/office/powerpoint/2010/main">
+          <mc:Choice Requires="p14">
             <p:contentPart p14:bwMode="auto" r:id="rId11">
               <p14:nvContentPartPr>
                 <p14:cNvPr id="26" name="Ink 25">
@@ -8943,7 +9035,7 @@
               </p14:xfrm>
             </p:contentPart>
           </mc:Choice>
-          <mc:Fallback>
+          <mc:Fallback xmlns="">
             <p:pic>
               <p:nvPicPr>
                 <p:cNvPr id="26" name="Ink 25">
@@ -8989,14 +9081,14 @@
         </p:nvGrpSpPr>
         <p:grpSpPr>
           <a:xfrm>
-            <a:off x="7074289" y="3662383"/>
+            <a:off x="7705411" y="3602703"/>
             <a:ext cx="326160" cy="183600"/>
             <a:chOff x="2386816" y="3682879"/>
             <a:chExt cx="326160" cy="183600"/>
           </a:xfrm>
         </p:grpSpPr>
-        <mc:AlternateContent xmlns:mc="http://schemas.openxmlformats.org/markup-compatibility/2006">
-          <mc:Choice xmlns:p14="http://schemas.microsoft.com/office/powerpoint/2010/main" Requires="p14">
+        <mc:AlternateContent xmlns:mc="http://schemas.openxmlformats.org/markup-compatibility/2006" xmlns:p14="http://schemas.microsoft.com/office/powerpoint/2010/main">
+          <mc:Choice Requires="p14">
             <p:contentPart p14:bwMode="auto" r:id="rId12">
               <p14:nvContentPartPr>
                 <p14:cNvPr id="28" name="Ink 27">
@@ -9015,7 +9107,7 @@
               </p14:xfrm>
             </p:contentPart>
           </mc:Choice>
-          <mc:Fallback>
+          <mc:Fallback xmlns="">
             <p:pic>
               <p:nvPicPr>
                 <p:cNvPr id="28" name="Ink 27">
@@ -9046,8 +9138,8 @@
             </p:pic>
           </mc:Fallback>
         </mc:AlternateContent>
-        <mc:AlternateContent xmlns:mc="http://schemas.openxmlformats.org/markup-compatibility/2006">
-          <mc:Choice xmlns:p14="http://schemas.microsoft.com/office/powerpoint/2010/main" Requires="p14">
+        <mc:AlternateContent xmlns:mc="http://schemas.openxmlformats.org/markup-compatibility/2006" xmlns:p14="http://schemas.microsoft.com/office/powerpoint/2010/main">
+          <mc:Choice Requires="p14">
             <p:contentPart p14:bwMode="auto" r:id="rId13">
               <p14:nvContentPartPr>
                 <p14:cNvPr id="29" name="Ink 28">
@@ -9066,7 +9158,7 @@
               </p14:xfrm>
             </p:contentPart>
           </mc:Choice>
-          <mc:Fallback>
+          <mc:Fallback xmlns="">
             <p:pic>
               <p:nvPicPr>
                 <p:cNvPr id="29" name="Ink 28">
@@ -9097,8 +9189,8 @@
             </p:pic>
           </mc:Fallback>
         </mc:AlternateContent>
-        <mc:AlternateContent xmlns:mc="http://schemas.openxmlformats.org/markup-compatibility/2006">
-          <mc:Choice xmlns:p14="http://schemas.microsoft.com/office/powerpoint/2010/main" Requires="p14">
+        <mc:AlternateContent xmlns:mc="http://schemas.openxmlformats.org/markup-compatibility/2006" xmlns:p14="http://schemas.microsoft.com/office/powerpoint/2010/main">
+          <mc:Choice Requires="p14">
             <p:contentPart p14:bwMode="auto" r:id="rId14">
               <p14:nvContentPartPr>
                 <p14:cNvPr id="30" name="Ink 29">
@@ -9117,7 +9209,7 @@
               </p14:xfrm>
             </p:contentPart>
           </mc:Choice>
-          <mc:Fallback>
+          <mc:Fallback xmlns="">
             <p:pic>
               <p:nvPicPr>
                 <p:cNvPr id="30" name="Ink 29">

</xml_diff>